<commit_message>
deposit presentation (add script)
</commit_message>
<xml_diff>
--- a/Integration New Homepage.pptx
+++ b/Integration New Homepage.pptx
@@ -5,10 +5,10 @@
     <p:sldMasterId id="2147483648" r:id="rId4"/>
   </p:sldMasterIdLst>
   <p:notesMasterIdLst>
-    <p:notesMasterId r:id="rId20"/>
+    <p:notesMasterId r:id="rId21"/>
   </p:notesMasterIdLst>
   <p:handoutMasterIdLst>
-    <p:handoutMasterId r:id="rId21"/>
+    <p:handoutMasterId r:id="rId22"/>
   </p:handoutMasterIdLst>
   <p:sldIdLst>
     <p:sldId id="258" r:id="rId5"/>
@@ -16,16 +16,17 @@
     <p:sldId id="286" r:id="rId7"/>
     <p:sldId id="313" r:id="rId8"/>
     <p:sldId id="323" r:id="rId9"/>
-    <p:sldId id="324" r:id="rId10"/>
-    <p:sldId id="317" r:id="rId11"/>
-    <p:sldId id="321" r:id="rId12"/>
-    <p:sldId id="318" r:id="rId13"/>
-    <p:sldId id="326" r:id="rId14"/>
-    <p:sldId id="327" r:id="rId15"/>
-    <p:sldId id="325" r:id="rId16"/>
-    <p:sldId id="270" r:id="rId17"/>
-    <p:sldId id="265" r:id="rId18"/>
-    <p:sldId id="316" r:id="rId19"/>
+    <p:sldId id="328" r:id="rId10"/>
+    <p:sldId id="324" r:id="rId11"/>
+    <p:sldId id="317" r:id="rId12"/>
+    <p:sldId id="321" r:id="rId13"/>
+    <p:sldId id="318" r:id="rId14"/>
+    <p:sldId id="326" r:id="rId15"/>
+    <p:sldId id="327" r:id="rId16"/>
+    <p:sldId id="325" r:id="rId17"/>
+    <p:sldId id="270" r:id="rId18"/>
+    <p:sldId id="265" r:id="rId19"/>
+    <p:sldId id="316" r:id="rId20"/>
   </p:sldIdLst>
   <p:sldSz cx="9144000" cy="6858000" type="screen4x3"/>
   <p:notesSz cx="6781800" cy="9880600"/>
@@ -243,7 +244,7 @@
           <a:p>
             <a:fld id="{5F0FE2F5-BF0B-458F-BA68-D31C89D23124}" type="datetimeFigureOut">
               <a:rPr lang="en-US" smtClean="0"/>
-              <a:t>7/8/2016</a:t>
+              <a:t>7/10/2016</a:t>
             </a:fld>
             <a:endParaRPr lang="en-US"/>
           </a:p>
@@ -413,7 +414,7 @@
           <a:p>
             <a:fld id="{9E995CF9-202A-4BA4-B451-D935646B39A7}" type="datetimeFigureOut">
               <a:rPr lang="en-US" smtClean="0"/>
-              <a:t>7/8/2016</a:t>
+              <a:t>7/10/2016</a:t>
             </a:fld>
             <a:endParaRPr lang="en-US"/>
           </a:p>
@@ -726,6 +727,14 @@
           <a:bodyPr/>
           <a:lstStyle/>
           <a:p>
+            <a:r>
+              <a:rPr lang="en-US" dirty="0" smtClean="0"/>
+              <a:t>Hi everyone.</a:t>
+            </a:r>
+            <a:r>
+              <a:rPr lang="en-US" baseline="0" dirty="0" smtClean="0"/>
+              <a:t> In my presentation today I would like to talk about Integration New Homepage</a:t>
+            </a:r>
             <a:endParaRPr lang="en-US" dirty="0"/>
           </a:p>
         </p:txBody>
@@ -810,7 +819,46 @@
           <a:bodyPr/>
           <a:lstStyle/>
           <a:p>
-            <a:endParaRPr lang="en-US"/>
+            <a:pPr marL="171450" indent="-171450">
+              <a:buFont typeface="Arial" panose="020B0604020202020204" pitchFamily="34" charset="0"/>
+              <a:buChar char="•"/>
+            </a:pPr>
+            <a:r>
+              <a:rPr lang="en-US" dirty="0" smtClean="0"/>
+              <a:t>Develop</a:t>
+            </a:r>
+            <a:r>
+              <a:rPr lang="en-US" baseline="0" dirty="0" smtClean="0"/>
+              <a:t> search engine to provide most frequent questions to users</a:t>
+            </a:r>
+          </a:p>
+          <a:p>
+            <a:pPr marL="171450" indent="-171450">
+              <a:buFont typeface="Arial" panose="020B0604020202020204" pitchFamily="34" charset="0"/>
+              <a:buChar char="•"/>
+            </a:pPr>
+            <a:r>
+              <a:rPr lang="en-US" baseline="0" dirty="0" smtClean="0"/>
+              <a:t>Provide next available transport windows (2 low/med &amp; 2 monthly) by input simple text – SID + window</a:t>
+            </a:r>
+          </a:p>
+          <a:p>
+            <a:pPr marL="171450" indent="-171450">
+              <a:buFont typeface="Arial" panose="020B0604020202020204" pitchFamily="34" charset="0"/>
+              <a:buChar char="•"/>
+            </a:pPr>
+            <a:r>
+              <a:rPr lang="en-US" baseline="0" dirty="0" smtClean="0"/>
+              <a:t>The data is</a:t>
+            </a:r>
+            <a:r>
+              <a:rPr lang="th-TH" baseline="0" dirty="0" smtClean="0"/>
+              <a:t> </a:t>
+            </a:r>
+            <a:r>
+              <a:rPr lang="en-US" baseline="0" dirty="0" smtClean="0"/>
+              <a:t>retrieved from the same input used for SAP One Master Calendar </a:t>
+            </a:r>
           </a:p>
         </p:txBody>
       </p:sp>
@@ -840,7 +888,7 @@
     </p:spTree>
     <p:extLst>
       <p:ext uri="{BB962C8B-B14F-4D97-AF65-F5344CB8AC3E}">
-        <p14:creationId xmlns:p14="http://schemas.microsoft.com/office/powerpoint/2010/main" val="1733598832"/>
+        <p14:creationId xmlns:p14="http://schemas.microsoft.com/office/powerpoint/2010/main" val="4088489286"/>
       </p:ext>
     </p:extLst>
   </p:cSld>
@@ -894,39 +942,7 @@
           <a:bodyPr/>
           <a:lstStyle/>
           <a:p>
-            <a:pPr marL="171450" indent="-171450">
-              <a:buFont typeface="Arial" panose="020B0604020202020204" pitchFamily="34" charset="0"/>
-              <a:buChar char="•"/>
-            </a:pPr>
-            <a:r>
-              <a:rPr lang="en-US" dirty="0" smtClean="0"/>
-              <a:t>Study</a:t>
-            </a:r>
-            <a:r>
-              <a:rPr lang="en-US" baseline="0" dirty="0" smtClean="0"/>
-              <a:t> requirement for the first few weeks?</a:t>
-            </a:r>
-          </a:p>
-          <a:p>
-            <a:pPr marL="171450" indent="-171450">
-              <a:buFont typeface="Arial" panose="020B0604020202020204" pitchFamily="34" charset="0"/>
-              <a:buChar char="•"/>
-            </a:pPr>
-            <a:r>
-              <a:rPr lang="en-US" baseline="0" dirty="0" smtClean="0"/>
-              <a:t>Decided to enable web trends to capture the data – when?</a:t>
-            </a:r>
-          </a:p>
-          <a:p>
-            <a:pPr marL="171450" indent="-171450">
-              <a:buFont typeface="Arial" panose="020B0604020202020204" pitchFamily="34" charset="0"/>
-              <a:buChar char="•"/>
-            </a:pPr>
-            <a:r>
-              <a:rPr lang="en-US" baseline="0" dirty="0" smtClean="0"/>
-              <a:t>Plan for internal feedback</a:t>
-            </a:r>
-            <a:endParaRPr lang="en-US" dirty="0"/>
+            <a:endParaRPr lang="en-US"/>
           </a:p>
         </p:txBody>
       </p:sp>
@@ -947,7 +963,7 @@
           <a:p>
             <a:fld id="{5FAD4E6B-B411-4931-BB72-70D19DE52CCE}" type="slidenum">
               <a:rPr lang="en-US" smtClean="0"/>
-              <a:t>12</a:t>
+              <a:t>11</a:t>
             </a:fld>
             <a:endParaRPr lang="en-US"/>
           </a:p>
@@ -956,7 +972,7 @@
     </p:spTree>
     <p:extLst>
       <p:ext uri="{BB962C8B-B14F-4D97-AF65-F5344CB8AC3E}">
-        <p14:creationId xmlns:p14="http://schemas.microsoft.com/office/powerpoint/2010/main" val="3297008188"/>
+        <p14:creationId xmlns:p14="http://schemas.microsoft.com/office/powerpoint/2010/main" val="1733598832"/>
       </p:ext>
     </p:extLst>
   </p:cSld>
@@ -1010,7 +1026,15 @@
           <a:bodyPr/>
           <a:lstStyle/>
           <a:p>
-            <a:endParaRPr lang="en-US"/>
+            <a:r>
+              <a:rPr lang="en-US" dirty="0" smtClean="0"/>
+              <a:t>Timeline,</a:t>
+            </a:r>
+            <a:r>
+              <a:rPr lang="en-US" baseline="0" dirty="0" smtClean="0"/>
+              <a:t> The things that completed is explore web pain points from user, web statistic collection (actually I still collect it until recycle) and made mockups as you saw it before. So, the next step I will do are gather feed back from Integration and process team after that I will recycle per each comment and then present the final version to all of you again and launch it on Aug 30.</a:t>
+            </a:r>
+            <a:endParaRPr lang="en-US" dirty="0"/>
           </a:p>
         </p:txBody>
       </p:sp>
@@ -1031,7 +1055,7 @@
           <a:p>
             <a:fld id="{5FAD4E6B-B411-4931-BB72-70D19DE52CCE}" type="slidenum">
               <a:rPr lang="en-US" smtClean="0"/>
-              <a:t>13</a:t>
+              <a:t>12</a:t>
             </a:fld>
             <a:endParaRPr lang="en-US"/>
           </a:p>
@@ -1040,7 +1064,7 @@
     </p:spTree>
     <p:extLst>
       <p:ext uri="{BB962C8B-B14F-4D97-AF65-F5344CB8AC3E}">
-        <p14:creationId xmlns:p14="http://schemas.microsoft.com/office/powerpoint/2010/main" val="2724849256"/>
+        <p14:creationId xmlns:p14="http://schemas.microsoft.com/office/powerpoint/2010/main" val="4277518540"/>
       </p:ext>
     </p:extLst>
   </p:cSld>
@@ -1094,7 +1118,131 @@
           <a:bodyPr/>
           <a:lstStyle/>
           <a:p>
+            <a:pPr marL="171450" indent="-171450">
+              <a:buFont typeface="Arial" panose="020B0604020202020204" pitchFamily="34" charset="0"/>
+              <a:buChar char="•"/>
+            </a:pPr>
+            <a:r>
+              <a:rPr lang="en-US" dirty="0" smtClean="0"/>
+              <a:t>Study</a:t>
+            </a:r>
+            <a:r>
+              <a:rPr lang="en-US" baseline="0" dirty="0" smtClean="0"/>
+              <a:t> requirement for the first few weeks?</a:t>
+            </a:r>
+          </a:p>
+          <a:p>
+            <a:pPr marL="171450" indent="-171450">
+              <a:buFont typeface="Arial" panose="020B0604020202020204" pitchFamily="34" charset="0"/>
+              <a:buChar char="•"/>
+            </a:pPr>
+            <a:r>
+              <a:rPr lang="en-US" baseline="0" dirty="0" smtClean="0"/>
+              <a:t>Decided to enable web trends to capture the data – when?</a:t>
+            </a:r>
+          </a:p>
+          <a:p>
+            <a:pPr marL="171450" indent="-171450">
+              <a:buFont typeface="Arial" panose="020B0604020202020204" pitchFamily="34" charset="0"/>
+              <a:buChar char="•"/>
+            </a:pPr>
+            <a:r>
+              <a:rPr lang="en-US" baseline="0" dirty="0" smtClean="0"/>
+              <a:t>Plan for internal feedback</a:t>
+            </a:r>
+            <a:endParaRPr lang="en-US" dirty="0"/>
+          </a:p>
+        </p:txBody>
+      </p:sp>
+      <p:sp>
+        <p:nvSpPr>
+          <p:cNvPr id="4" name="Slide Number Placeholder 3"/>
+          <p:cNvSpPr>
+            <a:spLocks noGrp="1"/>
+          </p:cNvSpPr>
+          <p:nvPr>
+            <p:ph type="sldNum" sz="quarter" idx="10"/>
+          </p:nvPr>
+        </p:nvSpPr>
+        <p:spPr/>
+        <p:txBody>
+          <a:bodyPr/>
+          <a:lstStyle/>
+          <a:p>
+            <a:fld id="{5FAD4E6B-B411-4931-BB72-70D19DE52CCE}" type="slidenum">
+              <a:rPr lang="en-US" smtClean="0"/>
+              <a:t>13</a:t>
+            </a:fld>
             <a:endParaRPr lang="en-US"/>
+          </a:p>
+        </p:txBody>
+      </p:sp>
+    </p:spTree>
+    <p:extLst>
+      <p:ext uri="{BB962C8B-B14F-4D97-AF65-F5344CB8AC3E}">
+        <p14:creationId xmlns:p14="http://schemas.microsoft.com/office/powerpoint/2010/main" val="3297008188"/>
+      </p:ext>
+    </p:extLst>
+  </p:cSld>
+  <p:clrMapOvr>
+    <a:masterClrMapping/>
+  </p:clrMapOvr>
+</p:notes>
+</file>
+
+<file path=ppt/notesSlides/notesSlide14.xml><?xml version="1.0" encoding="utf-8"?>
+<p:notes xmlns:a="http://schemas.openxmlformats.org/drawingml/2006/main" xmlns:r="http://schemas.openxmlformats.org/officeDocument/2006/relationships" xmlns:p="http://schemas.openxmlformats.org/presentationml/2006/main">
+  <p:cSld>
+    <p:spTree>
+      <p:nvGrpSpPr>
+        <p:cNvPr id="1" name=""/>
+        <p:cNvGrpSpPr/>
+        <p:nvPr/>
+      </p:nvGrpSpPr>
+      <p:grpSpPr>
+        <a:xfrm>
+          <a:off x="0" y="0"/>
+          <a:ext cx="0" cy="0"/>
+          <a:chOff x="0" y="0"/>
+          <a:chExt cx="0" cy="0"/>
+        </a:xfrm>
+      </p:grpSpPr>
+      <p:sp>
+        <p:nvSpPr>
+          <p:cNvPr id="2" name="Slide Image Placeholder 1"/>
+          <p:cNvSpPr>
+            <a:spLocks noGrp="1" noRot="1" noChangeAspect="1"/>
+          </p:cNvSpPr>
+          <p:nvPr>
+            <p:ph type="sldImg"/>
+          </p:nvPr>
+        </p:nvSpPr>
+        <p:spPr/>
+      </p:sp>
+      <p:sp>
+        <p:nvSpPr>
+          <p:cNvPr id="3" name="Notes Placeholder 2"/>
+          <p:cNvSpPr>
+            <a:spLocks noGrp="1"/>
+          </p:cNvSpPr>
+          <p:nvPr>
+            <p:ph type="body" idx="1"/>
+          </p:nvPr>
+        </p:nvSpPr>
+        <p:spPr/>
+        <p:txBody>
+          <a:bodyPr/>
+          <a:lstStyle/>
+          <a:p>
+            <a:r>
+              <a:rPr lang="en-US" dirty="0" smtClean="0"/>
+              <a:t>Ok,</a:t>
+            </a:r>
+            <a:r>
+              <a:rPr lang="en-US" baseline="0" dirty="0" smtClean="0"/>
+              <a:t> any question?</a:t>
+            </a:r>
+            <a:endParaRPr lang="en-US" dirty="0"/>
           </a:p>
         </p:txBody>
       </p:sp>
@@ -1116,6 +1264,90 @@
             <a:fld id="{5FAD4E6B-B411-4931-BB72-70D19DE52CCE}" type="slidenum">
               <a:rPr lang="en-US" smtClean="0"/>
               <a:t>14</a:t>
+            </a:fld>
+            <a:endParaRPr lang="en-US"/>
+          </a:p>
+        </p:txBody>
+      </p:sp>
+    </p:spTree>
+    <p:extLst>
+      <p:ext uri="{BB962C8B-B14F-4D97-AF65-F5344CB8AC3E}">
+        <p14:creationId xmlns:p14="http://schemas.microsoft.com/office/powerpoint/2010/main" val="2724849256"/>
+      </p:ext>
+    </p:extLst>
+  </p:cSld>
+  <p:clrMapOvr>
+    <a:masterClrMapping/>
+  </p:clrMapOvr>
+</p:notes>
+</file>
+
+<file path=ppt/notesSlides/notesSlide15.xml><?xml version="1.0" encoding="utf-8"?>
+<p:notes xmlns:a="http://schemas.openxmlformats.org/drawingml/2006/main" xmlns:r="http://schemas.openxmlformats.org/officeDocument/2006/relationships" xmlns:p="http://schemas.openxmlformats.org/presentationml/2006/main">
+  <p:cSld>
+    <p:spTree>
+      <p:nvGrpSpPr>
+        <p:cNvPr id="1" name=""/>
+        <p:cNvGrpSpPr/>
+        <p:nvPr/>
+      </p:nvGrpSpPr>
+      <p:grpSpPr>
+        <a:xfrm>
+          <a:off x="0" y="0"/>
+          <a:ext cx="0" cy="0"/>
+          <a:chOff x="0" y="0"/>
+          <a:chExt cx="0" cy="0"/>
+        </a:xfrm>
+      </p:grpSpPr>
+      <p:sp>
+        <p:nvSpPr>
+          <p:cNvPr id="2" name="Slide Image Placeholder 1"/>
+          <p:cNvSpPr>
+            <a:spLocks noGrp="1" noRot="1" noChangeAspect="1"/>
+          </p:cNvSpPr>
+          <p:nvPr>
+            <p:ph type="sldImg"/>
+          </p:nvPr>
+        </p:nvSpPr>
+        <p:spPr/>
+      </p:sp>
+      <p:sp>
+        <p:nvSpPr>
+          <p:cNvPr id="3" name="Notes Placeholder 2"/>
+          <p:cNvSpPr>
+            <a:spLocks noGrp="1"/>
+          </p:cNvSpPr>
+          <p:nvPr>
+            <p:ph type="body" idx="1"/>
+          </p:nvPr>
+        </p:nvSpPr>
+        <p:spPr/>
+        <p:txBody>
+          <a:bodyPr/>
+          <a:lstStyle/>
+          <a:p>
+            <a:endParaRPr lang="en-US"/>
+          </a:p>
+        </p:txBody>
+      </p:sp>
+      <p:sp>
+        <p:nvSpPr>
+          <p:cNvPr id="4" name="Slide Number Placeholder 3"/>
+          <p:cNvSpPr>
+            <a:spLocks noGrp="1"/>
+          </p:cNvSpPr>
+          <p:nvPr>
+            <p:ph type="sldNum" sz="quarter" idx="10"/>
+          </p:nvPr>
+        </p:nvSpPr>
+        <p:spPr/>
+        <p:txBody>
+          <a:bodyPr/>
+          <a:lstStyle/>
+          <a:p>
+            <a:fld id="{5FAD4E6B-B411-4931-BB72-70D19DE52CCE}" type="slidenum">
+              <a:rPr lang="en-US" smtClean="0"/>
+              <a:t>15</a:t>
             </a:fld>
             <a:endParaRPr lang="en-US"/>
           </a:p>
@@ -1178,7 +1410,15 @@
           <a:bodyPr/>
           <a:lstStyle/>
           <a:p>
-            <a:endParaRPr lang="en-US"/>
+            <a:r>
+              <a:rPr lang="en-US" dirty="0" smtClean="0"/>
+              <a:t>And the Agenda</a:t>
+            </a:r>
+            <a:r>
+              <a:rPr lang="en-US" baseline="0" dirty="0" smtClean="0"/>
+              <a:t> I will be talk in my presentation are Introduce my self, What are pain points in current integration site, Goal &amp; Design Concept in new site, Web Statistic from users clicked, new page Mockups Design, Feedback and Timeline</a:t>
+            </a:r>
+            <a:endParaRPr lang="en-US" dirty="0"/>
           </a:p>
         </p:txBody>
       </p:sp>
@@ -1262,6 +1502,30 @@
           <a:bodyPr/>
           <a:lstStyle/>
           <a:p>
+            <a:r>
+              <a:rPr lang="en-US" dirty="0" smtClean="0"/>
+              <a:t>So, First let’s</a:t>
+            </a:r>
+            <a:r>
+              <a:rPr lang="en-US" baseline="0" dirty="0" smtClean="0"/>
+              <a:t> start with introducing myself. My name is Pongpayak </a:t>
+            </a:r>
+            <a:r>
+              <a:rPr lang="en-US" baseline="0" dirty="0" err="1" smtClean="0"/>
+              <a:t>Boontaetae</a:t>
+            </a:r>
+            <a:r>
+              <a:rPr lang="en-US" baseline="0" dirty="0" smtClean="0"/>
+              <a:t>. I’m 3</a:t>
+            </a:r>
+            <a:r>
+              <a:rPr lang="en-US" baseline="30000" dirty="0" smtClean="0"/>
+              <a:t>rd</a:t>
+            </a:r>
+            <a:r>
+              <a:rPr lang="en-US" baseline="0" dirty="0" smtClean="0"/>
+              <a:t> year Computer Engineering student. My scope during  internship are …. And … </a:t>
+            </a:r>
             <a:endParaRPr lang="en-US" dirty="0"/>
           </a:p>
         </p:txBody>
@@ -1346,7 +1610,23 @@
           <a:bodyPr/>
           <a:lstStyle/>
           <a:p>
-            <a:endParaRPr lang="en-US"/>
+            <a:r>
+              <a:rPr lang="en-US" dirty="0" smtClean="0"/>
+              <a:t>OK, Next</a:t>
+            </a:r>
+            <a:r>
+              <a:rPr lang="en-US" baseline="0" dirty="0" smtClean="0"/>
+              <a:t> </a:t>
+            </a:r>
+            <a:r>
+              <a:rPr lang="en-US" dirty="0" smtClean="0"/>
+              <a:t>I’m going to talk about current team</a:t>
+            </a:r>
+            <a:r>
+              <a:rPr lang="en-US" baseline="0" dirty="0" smtClean="0"/>
+              <a:t> site pain points. These are feedbacks received from UCD.</a:t>
+            </a:r>
+            <a:endParaRPr lang="en-US" dirty="0"/>
           </a:p>
         </p:txBody>
       </p:sp>
@@ -1430,7 +1710,21 @@
           <a:bodyPr/>
           <a:lstStyle/>
           <a:p>
-            <a:endParaRPr lang="en-US"/>
+            <a:r>
+              <a:rPr lang="en-US" dirty="0" smtClean="0"/>
+              <a:t>Next,</a:t>
+            </a:r>
+            <a:r>
+              <a:rPr lang="en-US" baseline="0" dirty="0" smtClean="0"/>
+              <a:t> Goal &amp; Design Concept. The Goal are 3 important things. First to Improve the user interface for ease of use. Second to improve document search and third to correct content information and clean up documents.</a:t>
+            </a:r>
+          </a:p>
+          <a:p>
+            <a:r>
+              <a:rPr lang="en-US" baseline="0" dirty="0" smtClean="0"/>
+              <a:t>New site Design concept I need it to be a simple page that easy to find information easy to search document and spend a few click to access the information</a:t>
+            </a:r>
+            <a:endParaRPr lang="en-US" dirty="0"/>
           </a:p>
         </p:txBody>
       </p:sp>
@@ -1514,6 +1808,14 @@
           <a:bodyPr/>
           <a:lstStyle/>
           <a:p>
+            <a:r>
+              <a:rPr lang="en-US" dirty="0" smtClean="0"/>
+              <a:t>And</a:t>
+            </a:r>
+            <a:r>
+              <a:rPr lang="en-US" baseline="0" dirty="0" smtClean="0"/>
+              <a:t> I use the Service portal page layout to be the new homepage model</a:t>
+            </a:r>
             <a:endParaRPr lang="en-US" dirty="0"/>
           </a:p>
         </p:txBody>
@@ -1544,7 +1846,7 @@
     </p:spTree>
     <p:extLst>
       <p:ext uri="{BB962C8B-B14F-4D97-AF65-F5344CB8AC3E}">
-        <p14:creationId xmlns:p14="http://schemas.microsoft.com/office/powerpoint/2010/main" val="937487358"/>
+        <p14:creationId xmlns:p14="http://schemas.microsoft.com/office/powerpoint/2010/main" val="2816066174"/>
       </p:ext>
     </p:extLst>
   </p:cSld>
@@ -1598,63 +1900,21 @@
           <a:bodyPr/>
           <a:lstStyle/>
           <a:p>
-            <a:pPr marL="171450" indent="-171450">
-              <a:buFont typeface="Arial" panose="020B0604020202020204" pitchFamily="34" charset="0"/>
-              <a:buChar char="•"/>
-            </a:pPr>
             <a:r>
               <a:rPr lang="en-US" dirty="0" smtClean="0"/>
-              <a:t>Aligned with Service</a:t>
+              <a:t>Web statistic.</a:t>
             </a:r>
             <a:r>
               <a:rPr lang="en-US" baseline="0" dirty="0" smtClean="0"/>
-              <a:t> Portal theme</a:t>
-            </a:r>
-          </a:p>
-          <a:p>
-            <a:pPr marL="171450" indent="-171450">
-              <a:buFont typeface="Arial" panose="020B0604020202020204" pitchFamily="34" charset="0"/>
-              <a:buChar char="•"/>
-            </a:pPr>
+              <a:t> As you can see the graph, the column chart is show  about what user clicked in current homepage and the 3 most clicked are Team Documentation, SAP Calendar and CRB Repository. The pie chart is show about who is the user in our site and the result is 58 percent is integration team.</a:t>
+            </a:r>
+          </a:p>
+          <a:p>
             <a:r>
               <a:rPr lang="en-US" baseline="0" dirty="0" smtClean="0"/>
-              <a:t>Take web stat into consideration and frequent used buttons are placed </a:t>
-            </a:r>
-          </a:p>
-          <a:p>
-            <a:pPr marL="171450" indent="-171450">
-              <a:buFont typeface="Arial" panose="020B0604020202020204" pitchFamily="34" charset="0"/>
-              <a:buChar char="•"/>
-            </a:pPr>
-            <a:r>
-              <a:rPr lang="en-US" dirty="0" smtClean="0"/>
-              <a:t>SAP form – sequence</a:t>
-            </a:r>
-            <a:r>
-              <a:rPr lang="en-US" baseline="0" dirty="0" smtClean="0"/>
-              <a:t> by most frequently used</a:t>
-            </a:r>
-          </a:p>
-          <a:p>
-            <a:pPr marL="171450" indent="-171450">
-              <a:buFont typeface="Arial" panose="020B0604020202020204" pitchFamily="34" charset="0"/>
-              <a:buChar char="•"/>
-            </a:pPr>
-            <a:r>
-              <a:rPr lang="en-US" baseline="0" dirty="0" smtClean="0"/>
-              <a:t>Quick links – other frequently used by users</a:t>
-            </a:r>
-          </a:p>
-          <a:p>
-            <a:pPr marL="171450" indent="-171450">
-              <a:buFont typeface="Arial" panose="020B0604020202020204" pitchFamily="34" charset="0"/>
-              <a:buChar char="•"/>
-            </a:pPr>
-            <a:r>
-              <a:rPr lang="en-US" baseline="0" dirty="0" smtClean="0"/>
-              <a:t>Team Documents – easy for Integration members to upload documents at home page</a:t>
-            </a:r>
-            <a:endParaRPr lang="en-US" dirty="0" smtClean="0"/>
+              <a:t>What does I do about this statistic. I use it to analyze where should menu be. It like put the right menu on the right position.</a:t>
+            </a:r>
+            <a:endParaRPr lang="en-US" dirty="0"/>
           </a:p>
         </p:txBody>
       </p:sp>
@@ -1684,7 +1944,7 @@
     </p:spTree>
     <p:extLst>
       <p:ext uri="{BB962C8B-B14F-4D97-AF65-F5344CB8AC3E}">
-        <p14:creationId xmlns:p14="http://schemas.microsoft.com/office/powerpoint/2010/main" val="4139359623"/>
+        <p14:creationId xmlns:p14="http://schemas.microsoft.com/office/powerpoint/2010/main" val="937487358"/>
       </p:ext>
     </p:extLst>
   </p:cSld>
@@ -1742,7 +2002,59 @@
               <a:buFont typeface="Arial" panose="020B0604020202020204" pitchFamily="34" charset="0"/>
               <a:buChar char="•"/>
             </a:pPr>
-            <a:endParaRPr lang="en-US" baseline="0" dirty="0" smtClean="0"/>
+            <a:r>
+              <a:rPr lang="en-US" dirty="0" smtClean="0"/>
+              <a:t>Aligned with Service</a:t>
+            </a:r>
+            <a:r>
+              <a:rPr lang="en-US" baseline="0" dirty="0" smtClean="0"/>
+              <a:t> Portal theme</a:t>
+            </a:r>
+          </a:p>
+          <a:p>
+            <a:pPr marL="171450" indent="-171450">
+              <a:buFont typeface="Arial" panose="020B0604020202020204" pitchFamily="34" charset="0"/>
+              <a:buChar char="•"/>
+            </a:pPr>
+            <a:r>
+              <a:rPr lang="en-US" baseline="0" dirty="0" smtClean="0"/>
+              <a:t>Take web stat into consideration and frequent used buttons are placed </a:t>
+            </a:r>
+          </a:p>
+          <a:p>
+            <a:pPr marL="171450" indent="-171450">
+              <a:buFont typeface="Arial" panose="020B0604020202020204" pitchFamily="34" charset="0"/>
+              <a:buChar char="•"/>
+            </a:pPr>
+            <a:r>
+              <a:rPr lang="en-US" dirty="0" smtClean="0"/>
+              <a:t>SAP form – sequence</a:t>
+            </a:r>
+            <a:r>
+              <a:rPr lang="en-US" baseline="0" dirty="0" smtClean="0"/>
+              <a:t> by most frequently used</a:t>
+            </a:r>
+          </a:p>
+          <a:p>
+            <a:pPr marL="171450" indent="-171450">
+              <a:buFont typeface="Arial" panose="020B0604020202020204" pitchFamily="34" charset="0"/>
+              <a:buChar char="•"/>
+            </a:pPr>
+            <a:r>
+              <a:rPr lang="en-US" baseline="0" dirty="0" smtClean="0"/>
+              <a:t>Quick links – other frequently used by users</a:t>
+            </a:r>
+          </a:p>
+          <a:p>
+            <a:pPr marL="171450" indent="-171450">
+              <a:buFont typeface="Arial" panose="020B0604020202020204" pitchFamily="34" charset="0"/>
+              <a:buChar char="•"/>
+            </a:pPr>
+            <a:r>
+              <a:rPr lang="en-US" baseline="0" dirty="0" smtClean="0"/>
+              <a:t>Team Documents – easy for Integration members to upload documents at home page</a:t>
+            </a:r>
+            <a:endParaRPr lang="en-US" dirty="0" smtClean="0"/>
           </a:p>
         </p:txBody>
       </p:sp>
@@ -1772,7 +2084,7 @@
     </p:spTree>
     <p:extLst>
       <p:ext uri="{BB962C8B-B14F-4D97-AF65-F5344CB8AC3E}">
-        <p14:creationId xmlns:p14="http://schemas.microsoft.com/office/powerpoint/2010/main" val="1447311703"/>
+        <p14:creationId xmlns:p14="http://schemas.microsoft.com/office/powerpoint/2010/main" val="4139359623"/>
       </p:ext>
     </p:extLst>
   </p:cSld>
@@ -1830,42 +2142,7 @@
               <a:buFont typeface="Arial" panose="020B0604020202020204" pitchFamily="34" charset="0"/>
               <a:buChar char="•"/>
             </a:pPr>
-            <a:r>
-              <a:rPr lang="en-US" dirty="0" smtClean="0"/>
-              <a:t>Develop</a:t>
-            </a:r>
-            <a:r>
-              <a:rPr lang="en-US" baseline="0" dirty="0" smtClean="0"/>
-              <a:t> search engine to provide most frequent questions to users</a:t>
-            </a:r>
-          </a:p>
-          <a:p>
-            <a:pPr marL="171450" indent="-171450">
-              <a:buFont typeface="Arial" panose="020B0604020202020204" pitchFamily="34" charset="0"/>
-              <a:buChar char="•"/>
-            </a:pPr>
-            <a:r>
-              <a:rPr lang="en-US" baseline="0" dirty="0" smtClean="0"/>
-              <a:t>Provide next available transport windows (2 low/med &amp; 2 monthly) by input simple text – SID + window</a:t>
-            </a:r>
-          </a:p>
-          <a:p>
-            <a:pPr marL="171450" indent="-171450">
-              <a:buFont typeface="Arial" panose="020B0604020202020204" pitchFamily="34" charset="0"/>
-              <a:buChar char="•"/>
-            </a:pPr>
-            <a:r>
-              <a:rPr lang="en-US" baseline="0" dirty="0" smtClean="0"/>
-              <a:t>The data is</a:t>
-            </a:r>
-            <a:r>
-              <a:rPr lang="th-TH" baseline="0" dirty="0" smtClean="0"/>
-              <a:t> </a:t>
-            </a:r>
-            <a:r>
-              <a:rPr lang="en-US" baseline="0" dirty="0" smtClean="0"/>
-              <a:t>retrieved from the same input used for SAP One Master Calendar </a:t>
-            </a:r>
+            <a:endParaRPr lang="en-US" baseline="0" dirty="0" smtClean="0"/>
           </a:p>
         </p:txBody>
       </p:sp>
@@ -1895,7 +2172,7 @@
     </p:spTree>
     <p:extLst>
       <p:ext uri="{BB962C8B-B14F-4D97-AF65-F5344CB8AC3E}">
-        <p14:creationId xmlns:p14="http://schemas.microsoft.com/office/powerpoint/2010/main" val="4088489286"/>
+        <p14:creationId xmlns:p14="http://schemas.microsoft.com/office/powerpoint/2010/main" val="1447311703"/>
       </p:ext>
     </p:extLst>
   </p:cSld>
@@ -5197,22 +5474,50 @@
             <p:ph type="title"/>
           </p:nvPr>
         </p:nvSpPr>
-        <p:spPr/>
+        <p:spPr>
+          <a:xfrm>
+            <a:off x="194722" y="152400"/>
+            <a:ext cx="7577677" cy="609600"/>
+          </a:xfrm>
+        </p:spPr>
         <p:txBody>
           <a:bodyPr/>
           <a:lstStyle/>
           <a:p>
             <a:r>
-              <a:rPr lang="en-US" sz="3200" dirty="0" smtClean="0"/>
-              <a:t>Feed Backs!</a:t>
-            </a:r>
-            <a:endParaRPr lang="en-US" sz="3200" dirty="0"/>
-          </a:p>
-        </p:txBody>
-      </p:sp>
-      <p:sp>
-        <p:nvSpPr>
-          <p:cNvPr id="3" name="Content Placeholder 2"/>
+              <a:rPr lang="en-US" sz="3200" b="1" dirty="0" smtClean="0"/>
+              <a:t>New Transport Window Search</a:t>
+            </a:r>
+            <a:endParaRPr lang="en-US" sz="3200" b="1" dirty="0"/>
+          </a:p>
+        </p:txBody>
+      </p:sp>
+      <p:pic>
+        <p:nvPicPr>
+          <p:cNvPr id="5" name="Picture 4"/>
+          <p:cNvPicPr>
+            <a:picLocks noChangeAspect="1"/>
+          </p:cNvPicPr>
+          <p:nvPr/>
+        </p:nvPicPr>
+        <p:blipFill rotWithShape="1">
+          <a:blip r:embed="rId3"/>
+          <a:srcRect t="8393" b="5276"/>
+          <a:stretch/>
+        </p:blipFill>
+        <p:spPr>
+          <a:xfrm>
+            <a:off x="137699" y="1828800"/>
+            <a:ext cx="9006301" cy="4373563"/>
+          </a:xfrm>
+          <a:prstGeom prst="rect">
+            <a:avLst/>
+          </a:prstGeom>
+        </p:spPr>
+      </p:pic>
+      <p:sp>
+        <p:nvSpPr>
+          <p:cNvPr id="6" name="Content Placeholder 2"/>
           <p:cNvSpPr>
             <a:spLocks noGrp="1"/>
           </p:cNvSpPr>
@@ -5220,56 +5525,81 @@
             <p:ph idx="1"/>
           </p:nvPr>
         </p:nvSpPr>
-        <p:spPr/>
+        <p:spPr>
+          <a:xfrm>
+            <a:off x="223297" y="895353"/>
+            <a:ext cx="8763000" cy="857248"/>
+          </a:xfrm>
+          <a:solidFill>
+            <a:srgbClr val="FAFAFA"/>
+          </a:solidFill>
+        </p:spPr>
         <p:txBody>
           <a:bodyPr>
             <a:normAutofit/>
           </a:bodyPr>
           <a:lstStyle/>
           <a:p>
-            <a:pPr lvl="1"/>
-            <a:endParaRPr lang="en-US" dirty="0" smtClean="0"/>
-          </a:p>
-          <a:p>
-            <a:pPr lvl="1"/>
-            <a:endParaRPr lang="en-US" dirty="0"/>
-          </a:p>
-          <a:p>
-            <a:endParaRPr lang="en-US" dirty="0"/>
-          </a:p>
-        </p:txBody>
-      </p:sp>
-      <p:sp>
-        <p:nvSpPr>
-          <p:cNvPr id="4" name="Slide Number Placeholder 3"/>
-          <p:cNvSpPr>
-            <a:spLocks noGrp="1"/>
-          </p:cNvSpPr>
-          <p:nvPr>
-            <p:ph type="sldNum" sz="quarter" idx="13"/>
-          </p:nvPr>
-        </p:nvSpPr>
-        <p:spPr/>
-        <p:txBody>
-          <a:bodyPr/>
-          <a:lstStyle/>
-          <a:p>
-            <a:fld id="{B6F15528-21DE-4FAA-801E-634DDDAF4B2B}" type="slidenum">
-              <a:rPr smtClean="0">
+            <a:r>
+              <a:rPr lang="en-US" sz="1400" dirty="0" smtClean="0"/>
+              <a:t>Put in new Search function, utilizing same Search field for document search</a:t>
+            </a:r>
+          </a:p>
+          <a:p>
+            <a:r>
+              <a:rPr lang="en-US" sz="1400" dirty="0" smtClean="0"/>
+              <a:t>Use simply keyword “[SID] Window” i.e. G1P window and function will display next available transport windows</a:t>
+            </a:r>
+          </a:p>
+          <a:p>
+            <a:r>
+              <a:rPr lang="en-US" sz="1400" dirty="0" smtClean="0"/>
+              <a:t>Data </a:t>
+            </a:r>
+            <a:r>
+              <a:rPr lang="en-US" sz="1400" dirty="0"/>
+              <a:t>is retrieved from the same input used for SAP One Master </a:t>
+            </a:r>
+            <a:r>
+              <a:rPr lang="en-US" sz="1400" dirty="0" smtClean="0"/>
+              <a:t>Calendar, no extra maintenance</a:t>
+            </a:r>
+            <a:endParaRPr lang="en-US" sz="1400" dirty="0"/>
+          </a:p>
+        </p:txBody>
+      </p:sp>
+      <p:sp>
+        <p:nvSpPr>
+          <p:cNvPr id="8" name="Rectangle 7"/>
+          <p:cNvSpPr/>
+          <p:nvPr/>
+        </p:nvSpPr>
+        <p:spPr>
+          <a:xfrm>
+            <a:off x="7499287" y="5791200"/>
+            <a:ext cx="1323504" cy="276999"/>
+          </a:xfrm>
+          <a:prstGeom prst="rect">
+            <a:avLst/>
+          </a:prstGeom>
+        </p:spPr>
+        <p:txBody>
+          <a:bodyPr wrap="none">
+            <a:spAutoFit/>
+          </a:bodyPr>
+          <a:lstStyle/>
+          <a:p>
+            <a:r>
+              <a:rPr lang="en-US" sz="1200" dirty="0" smtClean="0">
                 <a:solidFill>
-                  <a:prstClr val="white">
-                    <a:lumMod val="75000"/>
-                  </a:prstClr>
+                  <a:srgbClr val="0000FF"/>
                 </a:solidFill>
               </a:rPr>
-              <a:pPr/>
-              <a:t>10</a:t>
-            </a:fld>
-            <a:endParaRPr dirty="0">
+              <a:t>* Not final version</a:t>
+            </a:r>
+            <a:endParaRPr lang="en-US" sz="1050" dirty="0">
               <a:solidFill>
-                <a:prstClr val="white">
-                  <a:lumMod val="75000"/>
-                </a:prstClr>
+                <a:srgbClr val="0000FF"/>
               </a:solidFill>
             </a:endParaRPr>
           </a:p>
@@ -5278,7 +5608,7 @@
     </p:spTree>
     <p:extLst>
       <p:ext uri="{BB962C8B-B14F-4D97-AF65-F5344CB8AC3E}">
-        <p14:creationId xmlns:p14="http://schemas.microsoft.com/office/powerpoint/2010/main" val="2710835603"/>
+        <p14:creationId xmlns:p14="http://schemas.microsoft.com/office/powerpoint/2010/main" val="3218848788"/>
       </p:ext>
     </p:extLst>
   </p:cSld>
@@ -5328,6 +5658,131 @@
           <a:lstStyle/>
           <a:p>
             <a:r>
+              <a:rPr lang="en-US" sz="3200" dirty="0" smtClean="0"/>
+              <a:t>Feed Backs!</a:t>
+            </a:r>
+            <a:endParaRPr lang="en-US" sz="3200" dirty="0"/>
+          </a:p>
+        </p:txBody>
+      </p:sp>
+      <p:sp>
+        <p:nvSpPr>
+          <p:cNvPr id="3" name="Content Placeholder 2"/>
+          <p:cNvSpPr>
+            <a:spLocks noGrp="1"/>
+          </p:cNvSpPr>
+          <p:nvPr>
+            <p:ph idx="1"/>
+          </p:nvPr>
+        </p:nvSpPr>
+        <p:spPr/>
+        <p:txBody>
+          <a:bodyPr>
+            <a:normAutofit/>
+          </a:bodyPr>
+          <a:lstStyle/>
+          <a:p>
+            <a:pPr lvl="1"/>
+            <a:endParaRPr lang="en-US" dirty="0" smtClean="0"/>
+          </a:p>
+          <a:p>
+            <a:pPr lvl="1"/>
+            <a:endParaRPr lang="en-US" dirty="0"/>
+          </a:p>
+          <a:p>
+            <a:endParaRPr lang="en-US" dirty="0"/>
+          </a:p>
+        </p:txBody>
+      </p:sp>
+      <p:sp>
+        <p:nvSpPr>
+          <p:cNvPr id="4" name="Slide Number Placeholder 3"/>
+          <p:cNvSpPr>
+            <a:spLocks noGrp="1"/>
+          </p:cNvSpPr>
+          <p:nvPr>
+            <p:ph type="sldNum" sz="quarter" idx="13"/>
+          </p:nvPr>
+        </p:nvSpPr>
+        <p:spPr/>
+        <p:txBody>
+          <a:bodyPr/>
+          <a:lstStyle/>
+          <a:p>
+            <a:fld id="{B6F15528-21DE-4FAA-801E-634DDDAF4B2B}" type="slidenum">
+              <a:rPr smtClean="0">
+                <a:solidFill>
+                  <a:prstClr val="white">
+                    <a:lumMod val="75000"/>
+                  </a:prstClr>
+                </a:solidFill>
+              </a:rPr>
+              <a:pPr/>
+              <a:t>11</a:t>
+            </a:fld>
+            <a:endParaRPr dirty="0">
+              <a:solidFill>
+                <a:prstClr val="white">
+                  <a:lumMod val="75000"/>
+                </a:prstClr>
+              </a:solidFill>
+            </a:endParaRPr>
+          </a:p>
+        </p:txBody>
+      </p:sp>
+    </p:spTree>
+    <p:extLst>
+      <p:ext uri="{BB962C8B-B14F-4D97-AF65-F5344CB8AC3E}">
+        <p14:creationId xmlns:p14="http://schemas.microsoft.com/office/powerpoint/2010/main" val="2710835603"/>
+      </p:ext>
+    </p:extLst>
+  </p:cSld>
+  <p:clrMapOvr>
+    <a:masterClrMapping/>
+  </p:clrMapOvr>
+  <p:timing>
+    <p:tnLst>
+      <p:par>
+        <p:cTn id="1" dur="indefinite" restart="never" nodeType="tmRoot"/>
+      </p:par>
+    </p:tnLst>
+  </p:timing>
+</p:sld>
+</file>
+
+<file path=ppt/slides/slide12.xml><?xml version="1.0" encoding="utf-8"?>
+<p:sld xmlns:a="http://schemas.openxmlformats.org/drawingml/2006/main" xmlns:r="http://schemas.openxmlformats.org/officeDocument/2006/relationships" xmlns:p="http://schemas.openxmlformats.org/presentationml/2006/main">
+  <p:cSld>
+    <p:spTree>
+      <p:nvGrpSpPr>
+        <p:cNvPr id="1" name=""/>
+        <p:cNvGrpSpPr/>
+        <p:nvPr/>
+      </p:nvGrpSpPr>
+      <p:grpSpPr>
+        <a:xfrm>
+          <a:off x="0" y="0"/>
+          <a:ext cx="0" cy="0"/>
+          <a:chOff x="0" y="0"/>
+          <a:chExt cx="0" cy="0"/>
+        </a:xfrm>
+      </p:grpSpPr>
+      <p:sp>
+        <p:nvSpPr>
+          <p:cNvPr id="2" name="Title 1"/>
+          <p:cNvSpPr>
+            <a:spLocks noGrp="1"/>
+          </p:cNvSpPr>
+          <p:nvPr>
+            <p:ph type="title"/>
+          </p:nvPr>
+        </p:nvSpPr>
+        <p:spPr/>
+        <p:txBody>
+          <a:bodyPr/>
+          <a:lstStyle/>
+          <a:p>
+            <a:r>
               <a:rPr lang="en-US" dirty="0" smtClean="0"/>
               <a:t>Timeline</a:t>
             </a:r>
@@ -5462,7 +5917,7 @@
             <a:fld id="{B6F15528-21DE-4FAA-801E-634DDDAF4B2B}" type="slidenum">
               <a:rPr lang="en-US" smtClean="0"/>
               <a:pPr/>
-              <a:t>11</a:t>
+              <a:t>12</a:t>
             </a:fld>
             <a:endParaRPr lang="en-US"/>
           </a:p>
@@ -5488,7 +5943,7 @@
 </p:sld>
 </file>
 
-<file path=ppt/slides/slide12.xml><?xml version="1.0" encoding="utf-8"?>
+<file path=ppt/slides/slide13.xml><?xml version="1.0" encoding="utf-8"?>
 <p:sld xmlns:a="http://schemas.openxmlformats.org/drawingml/2006/main" xmlns:r="http://schemas.openxmlformats.org/officeDocument/2006/relationships" xmlns:p="http://schemas.openxmlformats.org/presentationml/2006/main" show="0">
   <p:cSld>
     <p:spTree>
@@ -5551,7 +6006,7 @@
             <a:fld id="{B6F15528-21DE-4FAA-801E-634DDDAF4B2B}" type="slidenum">
               <a:rPr lang="en-US" smtClean="0"/>
               <a:pPr/>
-              <a:t>12</a:t>
+              <a:t>13</a:t>
             </a:fld>
             <a:endParaRPr lang="en-US"/>
           </a:p>
@@ -5683,75 +6138,14 @@
   <p:clrMapOvr>
     <a:masterClrMapping/>
   </p:clrMapOvr>
-  <mc:AlternateContent xmlns:mc="http://schemas.openxmlformats.org/markup-compatibility/2006">
-    <mc:Choice xmlns:p14="http://schemas.microsoft.com/office/powerpoint/2010/main" Requires="p14">
+  <mc:AlternateContent xmlns:mc="http://schemas.openxmlformats.org/markup-compatibility/2006" xmlns:p14="http://schemas.microsoft.com/office/powerpoint/2010/main">
+    <mc:Choice Requires="p14">
       <p:transition spd="slow" p14:dur="2000"/>
     </mc:Choice>
-    <mc:Fallback>
+    <mc:Fallback xmlns="">
       <p:transition spd="slow"/>
     </mc:Fallback>
   </mc:AlternateContent>
-  <p:timing>
-    <p:tnLst>
-      <p:par>
-        <p:cTn id="1" dur="indefinite" restart="never" nodeType="tmRoot"/>
-      </p:par>
-    </p:tnLst>
-  </p:timing>
-</p:sld>
-</file>
-
-<file path=ppt/slides/slide13.xml><?xml version="1.0" encoding="utf-8"?>
-<p:sld xmlns:a="http://schemas.openxmlformats.org/drawingml/2006/main" xmlns:r="http://schemas.openxmlformats.org/officeDocument/2006/relationships" xmlns:p="http://schemas.openxmlformats.org/presentationml/2006/main">
-  <p:cSld>
-    <p:spTree>
-      <p:nvGrpSpPr>
-        <p:cNvPr id="1" name=""/>
-        <p:cNvGrpSpPr/>
-        <p:nvPr/>
-      </p:nvGrpSpPr>
-      <p:grpSpPr>
-        <a:xfrm>
-          <a:off x="0" y="0"/>
-          <a:ext cx="0" cy="0"/>
-          <a:chOff x="0" y="0"/>
-          <a:chExt cx="0" cy="0"/>
-        </a:xfrm>
-      </p:grpSpPr>
-      <p:sp>
-        <p:nvSpPr>
-          <p:cNvPr id="3" name="Slide Number Placeholder 2"/>
-          <p:cNvSpPr>
-            <a:spLocks noGrp="1"/>
-          </p:cNvSpPr>
-          <p:nvPr>
-            <p:ph type="sldNum" sz="quarter" idx="12"/>
-          </p:nvPr>
-        </p:nvSpPr>
-        <p:spPr/>
-        <p:txBody>
-          <a:bodyPr/>
-          <a:lstStyle/>
-          <a:p>
-            <a:fld id="{B6F15528-21DE-4FAA-801E-634DDDAF4B2B}" type="slidenum">
-              <a:rPr lang="en-US" smtClean="0"/>
-              <a:pPr/>
-              <a:t>13</a:t>
-            </a:fld>
-            <a:endParaRPr lang="en-US"/>
-          </a:p>
-        </p:txBody>
-      </p:sp>
-    </p:spTree>
-    <p:extLst>
-      <p:ext uri="{BB962C8B-B14F-4D97-AF65-F5344CB8AC3E}">
-        <p14:creationId xmlns:p14="http://schemas.microsoft.com/office/powerpoint/2010/main" val="2515504787"/>
-      </p:ext>
-    </p:extLst>
-  </p:cSld>
-  <p:clrMapOvr>
-    <a:masterClrMapping/>
-  </p:clrMapOvr>
   <p:timing>
     <p:tnLst>
       <p:par>
@@ -5781,6 +6175,67 @@
       </p:grpSpPr>
       <p:sp>
         <p:nvSpPr>
+          <p:cNvPr id="3" name="Slide Number Placeholder 2"/>
+          <p:cNvSpPr>
+            <a:spLocks noGrp="1"/>
+          </p:cNvSpPr>
+          <p:nvPr>
+            <p:ph type="sldNum" sz="quarter" idx="12"/>
+          </p:nvPr>
+        </p:nvSpPr>
+        <p:spPr/>
+        <p:txBody>
+          <a:bodyPr/>
+          <a:lstStyle/>
+          <a:p>
+            <a:fld id="{B6F15528-21DE-4FAA-801E-634DDDAF4B2B}" type="slidenum">
+              <a:rPr lang="en-US" smtClean="0"/>
+              <a:pPr/>
+              <a:t>14</a:t>
+            </a:fld>
+            <a:endParaRPr lang="en-US"/>
+          </a:p>
+        </p:txBody>
+      </p:sp>
+    </p:spTree>
+    <p:extLst>
+      <p:ext uri="{BB962C8B-B14F-4D97-AF65-F5344CB8AC3E}">
+        <p14:creationId xmlns:p14="http://schemas.microsoft.com/office/powerpoint/2010/main" val="2515504787"/>
+      </p:ext>
+    </p:extLst>
+  </p:cSld>
+  <p:clrMapOvr>
+    <a:masterClrMapping/>
+  </p:clrMapOvr>
+  <p:timing>
+    <p:tnLst>
+      <p:par>
+        <p:cTn id="1" dur="indefinite" restart="never" nodeType="tmRoot"/>
+      </p:par>
+    </p:tnLst>
+  </p:timing>
+</p:sld>
+</file>
+
+<file path=ppt/slides/slide15.xml><?xml version="1.0" encoding="utf-8"?>
+<p:sld xmlns:a="http://schemas.openxmlformats.org/drawingml/2006/main" xmlns:r="http://schemas.openxmlformats.org/officeDocument/2006/relationships" xmlns:p="http://schemas.openxmlformats.org/presentationml/2006/main">
+  <p:cSld>
+    <p:spTree>
+      <p:nvGrpSpPr>
+        <p:cNvPr id="1" name=""/>
+        <p:cNvGrpSpPr/>
+        <p:nvPr/>
+      </p:nvGrpSpPr>
+      <p:grpSpPr>
+        <a:xfrm>
+          <a:off x="0" y="0"/>
+          <a:ext cx="0" cy="0"/>
+          <a:chOff x="0" y="0"/>
+          <a:chExt cx="0" cy="0"/>
+        </a:xfrm>
+      </p:grpSpPr>
+      <p:sp>
+        <p:nvSpPr>
           <p:cNvPr id="4" name="Title 3"/>
           <p:cNvSpPr>
             <a:spLocks noGrp="1"/>
@@ -5862,7 +6317,7 @@
 </p:sld>
 </file>
 
-<file path=ppt/slides/slide15.xml><?xml version="1.0" encoding="utf-8"?>
+<file path=ppt/slides/slide16.xml><?xml version="1.0" encoding="utf-8"?>
 <p:sld xmlns:a="http://schemas.openxmlformats.org/drawingml/2006/main" xmlns:r="http://schemas.openxmlformats.org/officeDocument/2006/relationships" xmlns:p="http://schemas.openxmlformats.org/presentationml/2006/main">
   <p:cSld>
     <p:spTree>
@@ -6150,7 +6605,6 @@
               <a:rPr lang="en-US" dirty="0" smtClean="0"/>
               <a:t>Timeline</a:t>
             </a:r>
-            <a:endParaRPr lang="en-US" dirty="0" smtClean="0"/>
           </a:p>
           <a:p>
             <a:pPr lvl="1"/>
@@ -6781,7 +7235,6 @@
               <a:rPr lang="en-US" dirty="0" smtClean="0"/>
               <a:t>Portal page (All main functions in a page)</a:t>
             </a:r>
-            <a:endParaRPr lang="en-US" dirty="0" smtClean="0"/>
           </a:p>
         </p:txBody>
       </p:sp>
@@ -6842,6 +7295,101 @@
 </file>
 
 <file path=ppt/slides/slide6.xml><?xml version="1.0" encoding="utf-8"?>
+<p:sld xmlns:a="http://schemas.openxmlformats.org/drawingml/2006/main" xmlns:r="http://schemas.openxmlformats.org/officeDocument/2006/relationships" xmlns:p="http://schemas.openxmlformats.org/presentationml/2006/main">
+  <p:cSld>
+    <p:spTree>
+      <p:nvGrpSpPr>
+        <p:cNvPr id="1" name=""/>
+        <p:cNvGrpSpPr/>
+        <p:nvPr/>
+      </p:nvGrpSpPr>
+      <p:grpSpPr>
+        <a:xfrm>
+          <a:off x="0" y="0"/>
+          <a:ext cx="0" cy="0"/>
+          <a:chOff x="0" y="0"/>
+          <a:chExt cx="0" cy="0"/>
+        </a:xfrm>
+      </p:grpSpPr>
+      <p:sp>
+        <p:nvSpPr>
+          <p:cNvPr id="2" name="Title 1"/>
+          <p:cNvSpPr>
+            <a:spLocks noGrp="1"/>
+          </p:cNvSpPr>
+          <p:nvPr>
+            <p:ph type="title"/>
+          </p:nvPr>
+        </p:nvSpPr>
+        <p:spPr/>
+        <p:txBody>
+          <a:bodyPr/>
+          <a:lstStyle/>
+          <a:p>
+            <a:r>
+              <a:rPr lang="en-US" dirty="0"/>
+              <a:t>Goal &amp; Design Concept</a:t>
+            </a:r>
+          </a:p>
+        </p:txBody>
+      </p:sp>
+      <p:sp>
+        <p:nvSpPr>
+          <p:cNvPr id="3" name="Content Placeholder 2"/>
+          <p:cNvSpPr>
+            <a:spLocks noGrp="1"/>
+          </p:cNvSpPr>
+          <p:nvPr>
+            <p:ph idx="1"/>
+          </p:nvPr>
+        </p:nvSpPr>
+        <p:spPr/>
+        <p:txBody>
+          <a:bodyPr/>
+          <a:lstStyle/>
+          <a:p>
+            <a:endParaRPr lang="en-US" dirty="0"/>
+          </a:p>
+        </p:txBody>
+      </p:sp>
+      <p:sp>
+        <p:nvSpPr>
+          <p:cNvPr id="4" name="Slide Number Placeholder 3"/>
+          <p:cNvSpPr>
+            <a:spLocks noGrp="1"/>
+          </p:cNvSpPr>
+          <p:nvPr>
+            <p:ph type="sldNum" sz="quarter" idx="13"/>
+          </p:nvPr>
+        </p:nvSpPr>
+        <p:spPr/>
+        <p:txBody>
+          <a:bodyPr/>
+          <a:lstStyle/>
+          <a:p>
+            <a:fld id="{B6F15528-21DE-4FAA-801E-634DDDAF4B2B}" type="slidenum">
+              <a:rPr lang="en-US" smtClean="0"/>
+              <a:pPr/>
+              <a:t>6</a:t>
+            </a:fld>
+            <a:endParaRPr lang="en-US"/>
+          </a:p>
+        </p:txBody>
+      </p:sp>
+    </p:spTree>
+    <p:extLst>
+      <p:ext uri="{BB962C8B-B14F-4D97-AF65-F5344CB8AC3E}">
+        <p14:creationId xmlns:p14="http://schemas.microsoft.com/office/powerpoint/2010/main" val="1492913131"/>
+      </p:ext>
+    </p:extLst>
+  </p:cSld>
+  <p:clrMapOvr>
+    <a:masterClrMapping/>
+  </p:clrMapOvr>
+</p:sld>
+</file>
+
+<file path=ppt/slides/slide7.xml><?xml version="1.0" encoding="utf-8"?>
 <p:sld xmlns:a="http://schemas.openxmlformats.org/drawingml/2006/main" xmlns:r="http://schemas.openxmlformats.org/officeDocument/2006/relationships" xmlns:p="http://schemas.openxmlformats.org/presentationml/2006/main">
   <p:cSld>
     <p:spTree>
@@ -6968,15 +7516,7 @@
           <a:p>
             <a:r>
               <a:rPr lang="en-US" sz="1800" dirty="0" smtClean="0"/>
-              <a:t>58</a:t>
-            </a:r>
-            <a:r>
-              <a:rPr lang="en-US" sz="1800" dirty="0" smtClean="0"/>
-              <a:t>% </a:t>
-            </a:r>
-            <a:r>
-              <a:rPr lang="en-US" sz="1800" dirty="0" smtClean="0"/>
-              <a:t>is Integration users</a:t>
+              <a:t>58% is Integration users</a:t>
             </a:r>
             <a:endParaRPr lang="en-US" sz="1400" dirty="0" smtClean="0"/>
           </a:p>
@@ -7042,7 +7582,7 @@
 </p:sld>
 </file>
 
-<file path=ppt/slides/slide7.xml><?xml version="1.0" encoding="utf-8"?>
+<file path=ppt/slides/slide8.xml><?xml version="1.0" encoding="utf-8"?>
 <p:sld xmlns:a="http://schemas.openxmlformats.org/drawingml/2006/main" xmlns:r="http://schemas.openxmlformats.org/officeDocument/2006/relationships" xmlns:p="http://schemas.openxmlformats.org/presentationml/2006/main">
   <p:cSld>
     <p:spTree>
@@ -7130,7 +7670,7 @@
 </p:sld>
 </file>
 
-<file path=ppt/slides/slide8.xml><?xml version="1.0" encoding="utf-8"?>
+<file path=ppt/slides/slide9.xml><?xml version="1.0" encoding="utf-8"?>
 <p:sld xmlns:a="http://schemas.openxmlformats.org/drawingml/2006/main" xmlns:r="http://schemas.openxmlformats.org/officeDocument/2006/relationships" xmlns:p="http://schemas.openxmlformats.org/presentationml/2006/main">
   <p:cSld>
     <p:spTree>
@@ -7233,184 +7773,6 @@
     <p:extLst>
       <p:ext uri="{BB962C8B-B14F-4D97-AF65-F5344CB8AC3E}">
         <p14:creationId xmlns:p14="http://schemas.microsoft.com/office/powerpoint/2010/main" val="430067252"/>
-      </p:ext>
-    </p:extLst>
-  </p:cSld>
-  <p:clrMapOvr>
-    <a:masterClrMapping/>
-  </p:clrMapOvr>
-  <p:timing>
-    <p:tnLst>
-      <p:par>
-        <p:cTn id="1" dur="indefinite" restart="never" nodeType="tmRoot"/>
-      </p:par>
-    </p:tnLst>
-  </p:timing>
-</p:sld>
-</file>
-
-<file path=ppt/slides/slide9.xml><?xml version="1.0" encoding="utf-8"?>
-<p:sld xmlns:a="http://schemas.openxmlformats.org/drawingml/2006/main" xmlns:r="http://schemas.openxmlformats.org/officeDocument/2006/relationships" xmlns:p="http://schemas.openxmlformats.org/presentationml/2006/main">
-  <p:cSld>
-    <p:spTree>
-      <p:nvGrpSpPr>
-        <p:cNvPr id="1" name=""/>
-        <p:cNvGrpSpPr/>
-        <p:nvPr/>
-      </p:nvGrpSpPr>
-      <p:grpSpPr>
-        <a:xfrm>
-          <a:off x="0" y="0"/>
-          <a:ext cx="0" cy="0"/>
-          <a:chOff x="0" y="0"/>
-          <a:chExt cx="0" cy="0"/>
-        </a:xfrm>
-      </p:grpSpPr>
-      <p:sp>
-        <p:nvSpPr>
-          <p:cNvPr id="2" name="Title 1"/>
-          <p:cNvSpPr>
-            <a:spLocks noGrp="1"/>
-          </p:cNvSpPr>
-          <p:nvPr>
-            <p:ph type="title"/>
-          </p:nvPr>
-        </p:nvSpPr>
-        <p:spPr>
-          <a:xfrm>
-            <a:off x="194722" y="152400"/>
-            <a:ext cx="7577677" cy="609600"/>
-          </a:xfrm>
-        </p:spPr>
-        <p:txBody>
-          <a:bodyPr/>
-          <a:lstStyle/>
-          <a:p>
-            <a:r>
-              <a:rPr lang="en-US" sz="3200" b="1" dirty="0" smtClean="0"/>
-              <a:t>New Transport Window Search</a:t>
-            </a:r>
-            <a:endParaRPr lang="en-US" sz="3200" b="1" dirty="0"/>
-          </a:p>
-        </p:txBody>
-      </p:sp>
-      <p:pic>
-        <p:nvPicPr>
-          <p:cNvPr id="5" name="Picture 4"/>
-          <p:cNvPicPr>
-            <a:picLocks noChangeAspect="1"/>
-          </p:cNvPicPr>
-          <p:nvPr/>
-        </p:nvPicPr>
-        <p:blipFill rotWithShape="1">
-          <a:blip r:embed="rId3"/>
-          <a:srcRect t="8393" b="5276"/>
-          <a:stretch/>
-        </p:blipFill>
-        <p:spPr>
-          <a:xfrm>
-            <a:off x="137699" y="1828800"/>
-            <a:ext cx="9006301" cy="4373563"/>
-          </a:xfrm>
-          <a:prstGeom prst="rect">
-            <a:avLst/>
-          </a:prstGeom>
-        </p:spPr>
-      </p:pic>
-      <p:sp>
-        <p:nvSpPr>
-          <p:cNvPr id="6" name="Content Placeholder 2"/>
-          <p:cNvSpPr>
-            <a:spLocks noGrp="1"/>
-          </p:cNvSpPr>
-          <p:nvPr>
-            <p:ph idx="1"/>
-          </p:nvPr>
-        </p:nvSpPr>
-        <p:spPr>
-          <a:xfrm>
-            <a:off x="223297" y="895353"/>
-            <a:ext cx="8763000" cy="857248"/>
-          </a:xfrm>
-          <a:solidFill>
-            <a:srgbClr val="FAFAFA"/>
-          </a:solidFill>
-        </p:spPr>
-        <p:txBody>
-          <a:bodyPr>
-            <a:normAutofit/>
-          </a:bodyPr>
-          <a:lstStyle/>
-          <a:p>
-            <a:r>
-              <a:rPr lang="en-US" sz="1400" dirty="0" smtClean="0"/>
-              <a:t>Put in new Search function, utilizing same Search field for document search</a:t>
-            </a:r>
-          </a:p>
-          <a:p>
-            <a:r>
-              <a:rPr lang="en-US" sz="1400" dirty="0" smtClean="0"/>
-              <a:t>Use simply keyword “[SID] Window” i.e. G1P window and function will display next available transport windows</a:t>
-            </a:r>
-          </a:p>
-          <a:p>
-            <a:r>
-              <a:rPr lang="en-US" sz="1400" dirty="0" smtClean="0"/>
-              <a:t>Data </a:t>
-            </a:r>
-            <a:r>
-              <a:rPr lang="en-US" sz="1400" dirty="0"/>
-              <a:t>is retrieved from the same input used for SAP One Master </a:t>
-            </a:r>
-            <a:r>
-              <a:rPr lang="en-US" sz="1400" dirty="0" smtClean="0"/>
-              <a:t>Calendar, no extra maintenance</a:t>
-            </a:r>
-            <a:endParaRPr lang="en-US" sz="1400" dirty="0"/>
-          </a:p>
-        </p:txBody>
-      </p:sp>
-      <p:sp>
-        <p:nvSpPr>
-          <p:cNvPr id="8" name="Rectangle 7"/>
-          <p:cNvSpPr/>
-          <p:nvPr/>
-        </p:nvSpPr>
-        <p:spPr>
-          <a:xfrm>
-            <a:off x="7499287" y="5791200"/>
-            <a:ext cx="1323504" cy="276999"/>
-          </a:xfrm>
-          <a:prstGeom prst="rect">
-            <a:avLst/>
-          </a:prstGeom>
-        </p:spPr>
-        <p:txBody>
-          <a:bodyPr wrap="none">
-            <a:spAutoFit/>
-          </a:bodyPr>
-          <a:lstStyle/>
-          <a:p>
-            <a:r>
-              <a:rPr lang="en-US" sz="1200" dirty="0" smtClean="0">
-                <a:solidFill>
-                  <a:srgbClr val="0000FF"/>
-                </a:solidFill>
-              </a:rPr>
-              <a:t>* Not final version</a:t>
-            </a:r>
-            <a:endParaRPr lang="en-US" sz="1050" dirty="0">
-              <a:solidFill>
-                <a:srgbClr val="0000FF"/>
-              </a:solidFill>
-            </a:endParaRPr>
-          </a:p>
-        </p:txBody>
-      </p:sp>
-    </p:spTree>
-    <p:extLst>
-      <p:ext uri="{BB962C8B-B14F-4D97-AF65-F5344CB8AC3E}">
-        <p14:creationId xmlns:p14="http://schemas.microsoft.com/office/powerpoint/2010/main" val="3218848788"/>
       </p:ext>
     </p:extLst>
   </p:cSld>
@@ -8281,6 +8643,12 @@
 </file>
 
 <file path=customXml/item1.xml><?xml version="1.0" encoding="utf-8"?>
+<p:properties xmlns:p="http://schemas.microsoft.com/office/2006/metadata/properties" xmlns:xsi="http://www.w3.org/2001/XMLSchema-instance" xmlns:pc="http://schemas.microsoft.com/office/infopath/2007/PartnerControls">
+  <documentManagement/>
+</p:properties>
+</file>
+
+<file path=customXml/item2.xml><?xml version="1.0" encoding="utf-8"?>
 <ct:contentTypeSchema xmlns:ct="http://schemas.microsoft.com/office/2006/metadata/contentType" xmlns:ma="http://schemas.microsoft.com/office/2006/metadata/properties/metaAttributes" ct:_="" ma:_="" ma:contentTypeName="Document" ma:contentTypeID="0x0101001E4D37915C2B2446A9F3BAC87CF8A24E" ma:contentTypeVersion="0" ma:contentTypeDescription="Create a new document." ma:contentTypeScope="" ma:versionID="ca4ace26e6eb75a63c5e34ce41065c3b">
   <xsd:schema xmlns:xsd="http://www.w3.org/2001/XMLSchema" xmlns:xs="http://www.w3.org/2001/XMLSchema" xmlns:p="http://schemas.microsoft.com/office/2006/metadata/properties" targetNamespace="http://schemas.microsoft.com/office/2006/metadata/properties" ma:root="true" ma:fieldsID="482a050712299b61248e361e74d18a20">
     <xsd:element name="properties">
@@ -8394,12 +8762,6 @@
 </ct:contentTypeSchema>
 </file>
 
-<file path=customXml/item2.xml><?xml version="1.0" encoding="utf-8"?>
-<p:properties xmlns:p="http://schemas.microsoft.com/office/2006/metadata/properties" xmlns:xsi="http://www.w3.org/2001/XMLSchema-instance" xmlns:pc="http://schemas.microsoft.com/office/infopath/2007/PartnerControls">
-  <documentManagement/>
-</p:properties>
-</file>
-
 <file path=customXml/item3.xml><?xml version="1.0" encoding="utf-8"?>
 <?mso-contentType ?>
 <FormTemplates xmlns="http://schemas.microsoft.com/sharepoint/v3/contenttype/forms">
@@ -8410,6 +8772,21 @@
 </file>
 
 <file path=customXml/itemProps1.xml><?xml version="1.0" encoding="utf-8"?>
+<ds:datastoreItem xmlns:ds="http://schemas.openxmlformats.org/officeDocument/2006/customXml" ds:itemID="{C96FC4DE-B950-48CC-9952-1F0811CF7A16}">
+  <ds:schemaRefs>
+    <ds:schemaRef ds:uri="http://purl.org/dc/terms/"/>
+    <ds:schemaRef ds:uri="http://schemas.openxmlformats.org/package/2006/metadata/core-properties"/>
+    <ds:schemaRef ds:uri="http://purl.org/dc/dcmitype/"/>
+    <ds:schemaRef ds:uri="http://schemas.microsoft.com/office/infopath/2007/PartnerControls"/>
+    <ds:schemaRef ds:uri="http://schemas.microsoft.com/office/2006/documentManagement/types"/>
+    <ds:schemaRef ds:uri="http://purl.org/dc/elements/1.1/"/>
+    <ds:schemaRef ds:uri="http://schemas.microsoft.com/office/2006/metadata/properties"/>
+    <ds:schemaRef ds:uri="http://www.w3.org/XML/1998/namespace"/>
+  </ds:schemaRefs>
+</ds:datastoreItem>
+</file>
+
+<file path=customXml/itemProps2.xml><?xml version="1.0" encoding="utf-8"?>
 <ds:datastoreItem xmlns:ds="http://schemas.openxmlformats.org/officeDocument/2006/customXml" ds:itemID="{DD6F2295-4FB7-42B9-9498-DF1F61833439}">
   <ds:schemaRefs>
     <ds:schemaRef ds:uri="http://schemas.microsoft.com/office/2006/metadata/contentType"/>
@@ -8425,21 +8802,6 @@
 </ds:datastoreItem>
 </file>
 
-<file path=customXml/itemProps2.xml><?xml version="1.0" encoding="utf-8"?>
-<ds:datastoreItem xmlns:ds="http://schemas.openxmlformats.org/officeDocument/2006/customXml" ds:itemID="{C96FC4DE-B950-48CC-9952-1F0811CF7A16}">
-  <ds:schemaRefs>
-    <ds:schemaRef ds:uri="http://purl.org/dc/terms/"/>
-    <ds:schemaRef ds:uri="http://schemas.openxmlformats.org/package/2006/metadata/core-properties"/>
-    <ds:schemaRef ds:uri="http://purl.org/dc/dcmitype/"/>
-    <ds:schemaRef ds:uri="http://schemas.microsoft.com/office/infopath/2007/PartnerControls"/>
-    <ds:schemaRef ds:uri="http://schemas.microsoft.com/office/2006/documentManagement/types"/>
-    <ds:schemaRef ds:uri="http://purl.org/dc/elements/1.1/"/>
-    <ds:schemaRef ds:uri="http://schemas.microsoft.com/office/2006/metadata/properties"/>
-    <ds:schemaRef ds:uri="http://www.w3.org/XML/1998/namespace"/>
-  </ds:schemaRefs>
-</ds:datastoreItem>
-</file>
-
 <file path=customXml/itemProps3.xml><?xml version="1.0" encoding="utf-8"?>
 <ds:datastoreItem xmlns:ds="http://schemas.openxmlformats.org/officeDocument/2006/customXml" ds:itemID="{C16F5254-FBC5-4FD6-AD24-AEA313DD4667}">
   <ds:schemaRefs>

</xml_diff>